<commit_message>
Main PCB rev C done
</commit_message>
<xml_diff>
--- a/Electrical/Cable Management.pptx
+++ b/Electrical/Cable Management.pptx
@@ -4594,7 +4594,7 @@
         <p:spPr>
           <a:xfrm>
             <a:off x="8320535" y="3904037"/>
-            <a:ext cx="3142304" cy="2284582"/>
+            <a:ext cx="3142304" cy="1843871"/>
           </a:xfrm>
           <a:prstGeom prst="rect">
             <a:avLst/>
@@ -4701,46 +4701,6 @@
             <a:r>
               <a:rPr lang="en-AU" dirty="0"/>
               <a:t>M2B</a:t>
-            </a:r>
-          </a:p>
-          <a:p>
-            <a:pPr marL="285750" indent="-285750">
-              <a:buFont typeface="Arial" panose="020B0604020202020204" pitchFamily="34" charset="0"/>
-              <a:buChar char="•"/>
-            </a:pPr>
-            <a:r>
-              <a:rPr lang="en-AU" dirty="0"/>
-              <a:t>M3A</a:t>
-            </a:r>
-          </a:p>
-          <a:p>
-            <a:pPr marL="285750" indent="-285750">
-              <a:buFont typeface="Arial" panose="020B0604020202020204" pitchFamily="34" charset="0"/>
-              <a:buChar char="•"/>
-            </a:pPr>
-            <a:r>
-              <a:rPr lang="en-AU" dirty="0"/>
-              <a:t>M3B</a:t>
-            </a:r>
-          </a:p>
-          <a:p>
-            <a:pPr marL="285750" indent="-285750">
-              <a:buFont typeface="Arial" panose="020B0604020202020204" pitchFamily="34" charset="0"/>
-              <a:buChar char="•"/>
-            </a:pPr>
-            <a:r>
-              <a:rPr lang="en-AU" dirty="0"/>
-              <a:t>M4A</a:t>
-            </a:r>
-          </a:p>
-          <a:p>
-            <a:pPr marL="285750" indent="-285750">
-              <a:buFont typeface="Arial" panose="020B0604020202020204" pitchFamily="34" charset="0"/>
-              <a:buChar char="•"/>
-            </a:pPr>
-            <a:r>
-              <a:rPr lang="en-AU" dirty="0"/>
-              <a:t>M4B</a:t>
             </a:r>
           </a:p>
           <a:p>
@@ -4950,46 +4910,6 @@
             <a:r>
               <a:rPr lang="en-AU" dirty="0"/>
               <a:t>M2B</a:t>
-            </a:r>
-          </a:p>
-          <a:p>
-            <a:pPr marL="285750" indent="-285750">
-              <a:buFont typeface="Arial" panose="020B0604020202020204" pitchFamily="34" charset="0"/>
-              <a:buChar char="•"/>
-            </a:pPr>
-            <a:r>
-              <a:rPr lang="en-AU" dirty="0"/>
-              <a:t>M3A</a:t>
-            </a:r>
-          </a:p>
-          <a:p>
-            <a:pPr marL="285750" indent="-285750">
-              <a:buFont typeface="Arial" panose="020B0604020202020204" pitchFamily="34" charset="0"/>
-              <a:buChar char="•"/>
-            </a:pPr>
-            <a:r>
-              <a:rPr lang="en-AU" dirty="0"/>
-              <a:t>M3B</a:t>
-            </a:r>
-          </a:p>
-          <a:p>
-            <a:pPr marL="285750" indent="-285750">
-              <a:buFont typeface="Arial" panose="020B0604020202020204" pitchFamily="34" charset="0"/>
-              <a:buChar char="•"/>
-            </a:pPr>
-            <a:r>
-              <a:rPr lang="en-AU" dirty="0"/>
-              <a:t>M4A</a:t>
-            </a:r>
-          </a:p>
-          <a:p>
-            <a:pPr marL="285750" indent="-285750">
-              <a:buFont typeface="Arial" panose="020B0604020202020204" pitchFamily="34" charset="0"/>
-              <a:buChar char="•"/>
-            </a:pPr>
-            <a:r>
-              <a:rPr lang="en-AU" dirty="0"/>
-              <a:t>M4B</a:t>
             </a:r>
           </a:p>
           <a:p>

</xml_diff>